<commit_message>
rearrange slides dependency chart
</commit_message>
<xml_diff>
--- a/Sample Workflow Dependency-V3.pptx
+++ b/Sample Workflow Dependency-V3.pptx
@@ -246,7 +246,7 @@
           <a:p>
             <a:fld id="{CB8393A8-4562-4F50-B742-6E29655ED728}" type="datetimeFigureOut">
               <a:rPr lang="en-US" smtClean="0"/>
-              <a:t>3/25/2021</a:t>
+              <a:t>3/26/2021</a:t>
             </a:fld>
             <a:endParaRPr lang="en-US"/>
           </a:p>
@@ -416,7 +416,7 @@
           <a:p>
             <a:fld id="{CB8393A8-4562-4F50-B742-6E29655ED728}" type="datetimeFigureOut">
               <a:rPr lang="en-US" smtClean="0"/>
-              <a:t>3/25/2021</a:t>
+              <a:t>3/26/2021</a:t>
             </a:fld>
             <a:endParaRPr lang="en-US"/>
           </a:p>
@@ -596,7 +596,7 @@
           <a:p>
             <a:fld id="{CB8393A8-4562-4F50-B742-6E29655ED728}" type="datetimeFigureOut">
               <a:rPr lang="en-US" smtClean="0"/>
-              <a:t>3/25/2021</a:t>
+              <a:t>3/26/2021</a:t>
             </a:fld>
             <a:endParaRPr lang="en-US"/>
           </a:p>
@@ -766,7 +766,7 @@
           <a:p>
             <a:fld id="{CB8393A8-4562-4F50-B742-6E29655ED728}" type="datetimeFigureOut">
               <a:rPr lang="en-US" smtClean="0"/>
-              <a:t>3/25/2021</a:t>
+              <a:t>3/26/2021</a:t>
             </a:fld>
             <a:endParaRPr lang="en-US"/>
           </a:p>
@@ -1012,7 +1012,7 @@
           <a:p>
             <a:fld id="{CB8393A8-4562-4F50-B742-6E29655ED728}" type="datetimeFigureOut">
               <a:rPr lang="en-US" smtClean="0"/>
-              <a:t>3/25/2021</a:t>
+              <a:t>3/26/2021</a:t>
             </a:fld>
             <a:endParaRPr lang="en-US"/>
           </a:p>
@@ -1244,7 +1244,7 @@
           <a:p>
             <a:fld id="{CB8393A8-4562-4F50-B742-6E29655ED728}" type="datetimeFigureOut">
               <a:rPr lang="en-US" smtClean="0"/>
-              <a:t>3/25/2021</a:t>
+              <a:t>3/26/2021</a:t>
             </a:fld>
             <a:endParaRPr lang="en-US"/>
           </a:p>
@@ -1611,7 +1611,7 @@
           <a:p>
             <a:fld id="{CB8393A8-4562-4F50-B742-6E29655ED728}" type="datetimeFigureOut">
               <a:rPr lang="en-US" smtClean="0"/>
-              <a:t>3/25/2021</a:t>
+              <a:t>3/26/2021</a:t>
             </a:fld>
             <a:endParaRPr lang="en-US"/>
           </a:p>
@@ -1729,7 +1729,7 @@
           <a:p>
             <a:fld id="{CB8393A8-4562-4F50-B742-6E29655ED728}" type="datetimeFigureOut">
               <a:rPr lang="en-US" smtClean="0"/>
-              <a:t>3/25/2021</a:t>
+              <a:t>3/26/2021</a:t>
             </a:fld>
             <a:endParaRPr lang="en-US"/>
           </a:p>
@@ -1824,7 +1824,7 @@
           <a:p>
             <a:fld id="{CB8393A8-4562-4F50-B742-6E29655ED728}" type="datetimeFigureOut">
               <a:rPr lang="en-US" smtClean="0"/>
-              <a:t>3/25/2021</a:t>
+              <a:t>3/26/2021</a:t>
             </a:fld>
             <a:endParaRPr lang="en-US"/>
           </a:p>
@@ -2101,7 +2101,7 @@
           <a:p>
             <a:fld id="{CB8393A8-4562-4F50-B742-6E29655ED728}" type="datetimeFigureOut">
               <a:rPr lang="en-US" smtClean="0"/>
-              <a:t>3/25/2021</a:t>
+              <a:t>3/26/2021</a:t>
             </a:fld>
             <a:endParaRPr lang="en-US"/>
           </a:p>
@@ -2358,7 +2358,7 @@
           <a:p>
             <a:fld id="{CB8393A8-4562-4F50-B742-6E29655ED728}" type="datetimeFigureOut">
               <a:rPr lang="en-US" smtClean="0"/>
-              <a:t>3/25/2021</a:t>
+              <a:t>3/26/2021</a:t>
             </a:fld>
             <a:endParaRPr lang="en-US"/>
           </a:p>
@@ -2571,7 +2571,7 @@
           <a:p>
             <a:fld id="{CB8393A8-4562-4F50-B742-6E29655ED728}" type="datetimeFigureOut">
               <a:rPr lang="en-US" smtClean="0"/>
-              <a:t>3/25/2021</a:t>
+              <a:t>3/26/2021</a:t>
             </a:fld>
             <a:endParaRPr lang="en-US"/>
           </a:p>
@@ -16896,9 +16896,9 @@
         <p:grpSpPr>
           <a:xfrm>
             <a:off x="7409254" y="1568654"/>
-            <a:ext cx="3574969" cy="4361006"/>
+            <a:ext cx="4329265" cy="4640920"/>
             <a:chOff x="7441990" y="1738860"/>
-            <a:chExt cx="3574969" cy="4361006"/>
+            <a:chExt cx="4329265" cy="4640920"/>
           </a:xfrm>
         </p:grpSpPr>
         <p:sp>
@@ -16910,7 +16910,7 @@
           <p:spPr>
             <a:xfrm>
               <a:off x="7441990" y="1738860"/>
-              <a:ext cx="3574969" cy="4361006"/>
+              <a:ext cx="4329265" cy="4640920"/>
             </a:xfrm>
             <a:prstGeom prst="roundRect">
               <a:avLst>
@@ -16956,7 +16956,7 @@
           </p:nvSpPr>
           <p:spPr>
             <a:xfrm>
-              <a:off x="7595526" y="4441678"/>
+              <a:off x="7725953" y="4716989"/>
               <a:ext cx="1389260" cy="361051"/>
             </a:xfrm>
             <a:prstGeom prst="roundRect">
@@ -17017,8 +17017,8 @@
           </p:nvCxnSpPr>
           <p:spPr>
             <a:xfrm rot="5400000">
-              <a:off x="8202169" y="4349140"/>
-              <a:ext cx="180526" cy="4551"/>
+              <a:off x="8330657" y="3928579"/>
+              <a:ext cx="878336" cy="698484"/>
             </a:xfrm>
             <a:prstGeom prst="curvedConnector3">
               <a:avLst>
@@ -17052,7 +17052,7 @@
           </p:nvSpPr>
           <p:spPr>
             <a:xfrm>
-              <a:off x="7603680" y="3327302"/>
+              <a:off x="9119066" y="2761693"/>
               <a:ext cx="1389260" cy="361051"/>
             </a:xfrm>
             <a:prstGeom prst="roundRect">
@@ -17105,8 +17105,8 @@
           </p:nvSpPr>
           <p:spPr>
             <a:xfrm>
-              <a:off x="9459592" y="3307694"/>
-              <a:ext cx="1389260" cy="361051"/>
+              <a:off x="8495095" y="5343632"/>
+              <a:ext cx="1389260" cy="355933"/>
             </a:xfrm>
             <a:prstGeom prst="roundRect">
               <a:avLst/>
@@ -17221,7 +17221,7 @@
           </p:nvSpPr>
           <p:spPr>
             <a:xfrm>
-              <a:off x="7600077" y="3900101"/>
+              <a:off x="8424437" y="3477602"/>
               <a:ext cx="1389260" cy="361051"/>
             </a:xfrm>
             <a:prstGeom prst="roundRect">
@@ -17277,8 +17277,8 @@
           </p:nvCxnSpPr>
           <p:spPr>
             <a:xfrm rot="5400000">
-              <a:off x="8785472" y="1958551"/>
-              <a:ext cx="881589" cy="1855912"/>
+              <a:off x="9825969" y="2433440"/>
+              <a:ext cx="315980" cy="340526"/>
             </a:xfrm>
             <a:prstGeom prst="curvedConnector3">
               <a:avLst/>
@@ -17313,8 +17313,8 @@
           </p:nvCxnSpPr>
           <p:spPr>
             <a:xfrm rot="5400000">
-              <a:off x="8190635" y="3792426"/>
-              <a:ext cx="211748" cy="3603"/>
+              <a:off x="9288953" y="2952859"/>
+              <a:ext cx="354858" cy="694629"/>
             </a:xfrm>
             <a:prstGeom prst="curvedConnector3">
               <a:avLst>
@@ -17342,55 +17342,18 @@
         </p:cxnSp>
         <p:cxnSp>
           <p:nvCxnSpPr>
-            <p:cNvPr id="79" name="Curved Connector 78"/>
+            <p:cNvPr id="80" name="Curved Connector 79"/>
             <p:cNvCxnSpPr>
-              <a:stCxn id="57" idx="2"/>
+              <a:cxnSpLocks/>
+              <a:stCxn id="59" idx="2"/>
               <a:endCxn id="56" idx="0"/>
             </p:cNvCxnSpPr>
             <p:nvPr/>
           </p:nvCxnSpPr>
           <p:spPr>
-            <a:xfrm rot="5400000">
-              <a:off x="9723232" y="2876703"/>
-              <a:ext cx="861981" cy="12700"/>
-            </a:xfrm>
-            <a:prstGeom prst="curvedConnector3">
-              <a:avLst>
-                <a:gd name="adj1" fmla="val 50000"/>
-              </a:avLst>
-            </a:prstGeom>
-            <a:ln>
-              <a:tailEnd type="triangle"/>
-            </a:ln>
-          </p:spPr>
-          <p:style>
-            <a:lnRef idx="1">
-              <a:schemeClr val="accent1"/>
-            </a:lnRef>
-            <a:fillRef idx="0">
-              <a:schemeClr val="accent1"/>
-            </a:fillRef>
-            <a:effectRef idx="0">
-              <a:schemeClr val="accent1"/>
-            </a:effectRef>
-            <a:fontRef idx="minor">
-              <a:schemeClr val="tx1"/>
-            </a:fontRef>
-          </p:style>
-        </p:cxnSp>
-        <p:cxnSp>
-          <p:nvCxnSpPr>
-            <p:cNvPr id="80" name="Curved Connector 79"/>
-            <p:cNvCxnSpPr>
-              <a:stCxn id="59" idx="3"/>
-              <a:endCxn id="56" idx="1"/>
-            </p:cNvCxnSpPr>
-            <p:nvPr/>
-          </p:nvCxnSpPr>
-          <p:spPr>
-            <a:xfrm flipV="1">
-              <a:off x="8989337" y="3488220"/>
-              <a:ext cx="470255" cy="592407"/>
+            <a:xfrm rot="16200000" flipH="1">
+              <a:off x="8401907" y="4555813"/>
+              <a:ext cx="1504979" cy="70658"/>
             </a:xfrm>
             <a:prstGeom prst="curvedConnector3">
               <a:avLst>
@@ -17424,7 +17387,7 @@
           </p:nvSpPr>
           <p:spPr>
             <a:xfrm>
-              <a:off x="9459592" y="5630649"/>
+              <a:off x="9344982" y="5871323"/>
               <a:ext cx="1389260" cy="361051"/>
             </a:xfrm>
             <a:prstGeom prst="roundRect">
@@ -17482,7 +17445,7 @@
           </p:nvSpPr>
           <p:spPr>
             <a:xfrm>
-              <a:off x="8644811" y="4958022"/>
+              <a:off x="10349236" y="4957247"/>
               <a:ext cx="1389260" cy="361051"/>
             </a:xfrm>
             <a:prstGeom prst="roundRect">
@@ -17540,7 +17503,7 @@
           </p:nvSpPr>
           <p:spPr>
             <a:xfrm>
-              <a:off x="9465943" y="3991249"/>
+              <a:off x="9444214" y="4170418"/>
               <a:ext cx="1389260" cy="361051"/>
             </a:xfrm>
             <a:prstGeom prst="roundRect">
@@ -17594,15 +17557,16 @@
           <p:nvCxnSpPr>
             <p:cNvPr id="94" name="Curved Connector 93"/>
             <p:cNvCxnSpPr>
-              <a:stCxn id="56" idx="2"/>
+              <a:cxnSpLocks/>
+              <a:stCxn id="54" idx="2"/>
               <a:endCxn id="85" idx="0"/>
             </p:cNvCxnSpPr>
             <p:nvPr/>
           </p:nvCxnSpPr>
           <p:spPr>
             <a:xfrm rot="16200000" flipH="1">
-              <a:off x="9996145" y="3826821"/>
-              <a:ext cx="322504" cy="6351"/>
+              <a:off x="9452433" y="3484007"/>
+              <a:ext cx="1047674" cy="325148"/>
             </a:xfrm>
             <a:prstGeom prst="curvedConnector3">
               <a:avLst/>
@@ -17636,9 +17600,9 @@
             <p:nvPr/>
           </p:nvCxnSpPr>
           <p:spPr>
-            <a:xfrm rot="16200000" flipH="1">
-              <a:off x="9591043" y="5067470"/>
-              <a:ext cx="311576" cy="814781"/>
+            <a:xfrm rot="5400000">
+              <a:off x="10265227" y="5092683"/>
+              <a:ext cx="553025" cy="1004254"/>
             </a:xfrm>
             <a:prstGeom prst="curvedConnector3">
               <a:avLst>
@@ -17675,8 +17639,8 @@
           </p:nvCxnSpPr>
           <p:spPr>
             <a:xfrm rot="5400000">
-              <a:off x="9518224" y="4988299"/>
-              <a:ext cx="1278349" cy="6351"/>
+              <a:off x="9419301" y="5151780"/>
+              <a:ext cx="1339854" cy="99232"/>
             </a:xfrm>
             <a:prstGeom prst="curvedConnector3">
               <a:avLst>
@@ -21671,8 +21635,8 @@
         </p:nvCxnSpPr>
         <p:spPr>
           <a:xfrm flipV="1">
-            <a:off x="7149887" y="3337622"/>
-            <a:ext cx="421057" cy="312341"/>
+            <a:off x="7149887" y="2772013"/>
+            <a:ext cx="1936443" cy="877950"/>
           </a:xfrm>
           <a:prstGeom prst="curvedConnector3">
             <a:avLst/>
@@ -21706,9 +21670,9 @@
           <p:nvPr/>
         </p:nvCxnSpPr>
         <p:spPr>
-          <a:xfrm flipV="1">
-            <a:off x="7147853" y="5640969"/>
-            <a:ext cx="2279003" cy="9993"/>
+          <a:xfrm>
+            <a:off x="7147853" y="5650962"/>
+            <a:ext cx="2164393" cy="230681"/>
           </a:xfrm>
           <a:prstGeom prst="curvedConnector3">
             <a:avLst>
@@ -22055,7 +22019,7 @@
         </p:nvGrpSpPr>
         <p:grpSpPr>
           <a:xfrm>
-            <a:off x="7712280" y="6211348"/>
+            <a:off x="7712280" y="6415892"/>
             <a:ext cx="3260492" cy="1735859"/>
             <a:chOff x="8393988" y="6143883"/>
             <a:chExt cx="3260492" cy="1735859"/>
@@ -22465,8 +22429,8 @@
         </p:nvCxnSpPr>
         <p:spPr>
           <a:xfrm rot="16200000" flipH="1">
-            <a:off x="10385746" y="7517049"/>
-            <a:ext cx="551908" cy="1169017"/>
+            <a:off x="10488018" y="7619321"/>
+            <a:ext cx="347364" cy="1169017"/>
           </a:xfrm>
           <a:prstGeom prst="curvedConnector2">
             <a:avLst/>
@@ -23122,9 +23086,9 @@
           <p:nvPr/>
         </p:nvCxnSpPr>
         <p:spPr>
-          <a:xfrm rot="5400000">
-            <a:off x="9864048" y="6063554"/>
-            <a:ext cx="499498" cy="15378"/>
+          <a:xfrm rot="16200000" flipH="1">
+            <a:off x="9824808" y="6244236"/>
+            <a:ext cx="463368" cy="99232"/>
           </a:xfrm>
           <a:prstGeom prst="curvedConnector3">
             <a:avLst>
@@ -23161,8 +23125,8 @@
         </p:nvCxnSpPr>
         <p:spPr>
           <a:xfrm rot="16200000" flipH="1">
-            <a:off x="7576389" y="5313554"/>
-            <a:ext cx="1688469" cy="326406"/>
+            <a:off x="7676985" y="5618695"/>
+            <a:ext cx="1617702" cy="195979"/>
           </a:xfrm>
           <a:prstGeom prst="curvedConnector3">
             <a:avLst>
@@ -23235,8 +23199,8 @@
         </p:nvCxnSpPr>
         <p:spPr>
           <a:xfrm flipV="1">
-            <a:off x="7147853" y="3910421"/>
-            <a:ext cx="419488" cy="485122"/>
+            <a:off x="7147853" y="3487922"/>
+            <a:ext cx="1243848" cy="907621"/>
           </a:xfrm>
           <a:prstGeom prst="curvedConnector3">
             <a:avLst>
@@ -23273,8 +23237,8 @@
         </p:nvCxnSpPr>
         <p:spPr>
           <a:xfrm flipV="1">
-            <a:off x="7168950" y="4968342"/>
-            <a:ext cx="1443125" cy="7615"/>
+            <a:off x="7168950" y="4967567"/>
+            <a:ext cx="3147550" cy="8390"/>
           </a:xfrm>
           <a:prstGeom prst="curvedConnector3">
             <a:avLst>
@@ -23556,6 +23520,139 @@
           <a:prstGeom prst="curvedConnector3">
             <a:avLst>
               <a:gd name="adj1" fmla="val 39420"/>
+            </a:avLst>
+          </a:prstGeom>
+          <a:ln>
+            <a:tailEnd type="triangle"/>
+          </a:ln>
+        </p:spPr>
+        <p:style>
+          <a:lnRef idx="1">
+            <a:schemeClr val="accent1"/>
+          </a:lnRef>
+          <a:fillRef idx="0">
+            <a:schemeClr val="accent1"/>
+          </a:fillRef>
+          <a:effectRef idx="0">
+            <a:schemeClr val="accent1"/>
+          </a:effectRef>
+          <a:fontRef idx="minor">
+            <a:schemeClr val="tx1"/>
+          </a:fontRef>
+        </p:style>
+      </p:cxnSp>
+      <p:cxnSp>
+        <p:nvCxnSpPr>
+          <p:cNvPr id="176" name="Curved Connector 93">
+            <a:extLst>
+              <a:ext uri="{FF2B5EF4-FFF2-40B4-BE49-F238E27FC236}">
+                <a16:creationId xmlns:a16="http://schemas.microsoft.com/office/drawing/2014/main" id="{77980E59-4FF4-44B4-AB3A-30A4667CF8DC}"/>
+              </a:ext>
+            </a:extLst>
+          </p:cNvPr>
+          <p:cNvCxnSpPr>
+            <a:cxnSpLocks/>
+            <a:stCxn id="54" idx="3"/>
+            <a:endCxn id="83" idx="0"/>
+          </p:cNvCxnSpPr>
+          <p:nvPr/>
+        </p:nvCxnSpPr>
+        <p:spPr>
+          <a:xfrm>
+            <a:off x="10475590" y="2772013"/>
+            <a:ext cx="535540" cy="2015028"/>
+          </a:xfrm>
+          <a:prstGeom prst="curvedConnector2">
+            <a:avLst/>
+          </a:prstGeom>
+          <a:ln>
+            <a:tailEnd type="triangle"/>
+          </a:ln>
+        </p:spPr>
+        <p:style>
+          <a:lnRef idx="1">
+            <a:schemeClr val="accent1"/>
+          </a:lnRef>
+          <a:fillRef idx="0">
+            <a:schemeClr val="accent1"/>
+          </a:fillRef>
+          <a:effectRef idx="0">
+            <a:schemeClr val="accent1"/>
+          </a:effectRef>
+          <a:fontRef idx="minor">
+            <a:schemeClr val="tx1"/>
+          </a:fontRef>
+        </p:style>
+      </p:cxnSp>
+      <p:cxnSp>
+        <p:nvCxnSpPr>
+          <p:cNvPr id="177" name="Curved Connector 96">
+            <a:extLst>
+              <a:ext uri="{FF2B5EF4-FFF2-40B4-BE49-F238E27FC236}">
+                <a16:creationId xmlns:a16="http://schemas.microsoft.com/office/drawing/2014/main" id="{910EFAE1-265D-471D-8A81-9481293875B0}"/>
+              </a:ext>
+            </a:extLst>
+          </p:cNvPr>
+          <p:cNvCxnSpPr>
+            <a:cxnSpLocks/>
+            <a:stCxn id="56" idx="2"/>
+            <a:endCxn id="82" idx="0"/>
+          </p:cNvCxnSpPr>
+          <p:nvPr/>
+        </p:nvCxnSpPr>
+        <p:spPr>
+          <a:xfrm rot="16200000" flipH="1">
+            <a:off x="9496053" y="5190294"/>
+            <a:ext cx="171758" cy="849887"/>
+          </a:xfrm>
+          <a:prstGeom prst="curvedConnector3">
+            <a:avLst>
+              <a:gd name="adj1" fmla="val 50000"/>
+            </a:avLst>
+          </a:prstGeom>
+          <a:ln>
+            <a:tailEnd type="triangle"/>
+          </a:ln>
+        </p:spPr>
+        <p:style>
+          <a:lnRef idx="1">
+            <a:schemeClr val="accent1"/>
+          </a:lnRef>
+          <a:fillRef idx="0">
+            <a:schemeClr val="accent1"/>
+          </a:fillRef>
+          <a:effectRef idx="0">
+            <a:schemeClr val="accent1"/>
+          </a:effectRef>
+          <a:fontRef idx="minor">
+            <a:schemeClr val="tx1"/>
+          </a:fontRef>
+        </p:style>
+      </p:cxnSp>
+      <p:cxnSp>
+        <p:nvCxnSpPr>
+          <p:cNvPr id="239" name="Curved Connector 102">
+            <a:extLst>
+              <a:ext uri="{FF2B5EF4-FFF2-40B4-BE49-F238E27FC236}">
+                <a16:creationId xmlns:a16="http://schemas.microsoft.com/office/drawing/2014/main" id="{B6D5DC58-4B87-4B47-9E9B-C60022F0CBCC}"/>
+              </a:ext>
+            </a:extLst>
+          </p:cNvPr>
+          <p:cNvCxnSpPr>
+            <a:cxnSpLocks/>
+            <a:stCxn id="104" idx="3"/>
+            <a:endCxn id="85" idx="1"/>
+          </p:cNvCxnSpPr>
+          <p:nvPr/>
+        </p:nvCxnSpPr>
+        <p:spPr>
+          <a:xfrm flipV="1">
+            <a:off x="7147853" y="4180738"/>
+            <a:ext cx="2263625" cy="214805"/>
+          </a:xfrm>
+          <a:prstGeom prst="curvedConnector3">
+            <a:avLst>
+              <a:gd name="adj1" fmla="val 50000"/>
             </a:avLst>
           </a:prstGeom>
           <a:ln>

</xml_diff>